<commit_message>
Updated ppt, mpp, and xls
</commit_message>
<xml_diff>
--- a/Team Deliverable 1/ACA Risk Adjustment EHR Enhancement.pptx
+++ b/Team Deliverable 1/ACA Risk Adjustment EHR Enhancement.pptx
@@ -5,13 +5,13 @@
     <p:sldMasterId id="2147483648" r:id="rId1"/>
   </p:sldMasterIdLst>
   <p:notesMasterIdLst>
-    <p:notesMasterId r:id="rId13"/>
+    <p:notesMasterId r:id="rId14"/>
   </p:notesMasterIdLst>
   <p:sldIdLst>
     <p:sldId id="256" r:id="rId2"/>
-    <p:sldId id="257" r:id="rId3"/>
-    <p:sldId id="258" r:id="rId4"/>
-    <p:sldId id="259" r:id="rId5"/>
+    <p:sldId id="258" r:id="rId3"/>
+    <p:sldId id="259" r:id="rId4"/>
+    <p:sldId id="268" r:id="rId5"/>
     <p:sldId id="261" r:id="rId6"/>
     <p:sldId id="263" r:id="rId7"/>
     <p:sldId id="265" r:id="rId8"/>
@@ -19,6 +19,7 @@
     <p:sldId id="262" r:id="rId10"/>
     <p:sldId id="264" r:id="rId11"/>
     <p:sldId id="267" r:id="rId12"/>
+    <p:sldId id="269" r:id="rId13"/>
   </p:sldIdLst>
   <p:sldSz cx="9144000" cy="6858000" type="screen4x3"/>
   <p:notesSz cx="6858000" cy="9144000"/>
@@ -212,6 +213,40 @@
           </c:marker>
           <c:dLbls>
             <c:dLbl>
+              <c:idx val="0"/>
+              <c:layout/>
+              <c:tx>
+                <c:rich>
+                  <a:bodyPr/>
+                  <a:lstStyle/>
+                  <a:p>
+                    <a:r>
+                      <a:rPr lang="en-US"/>
+                      <a:t>   </a:t>
+                    </a:r>
+                    <a:r>
+                      <a:rPr lang="en-US" smtClean="0"/>
+                      <a:t>Scope </a:t>
+                    </a:r>
+                    <a:r>
+                      <a:rPr lang="en-US" sz="1050" b="1" i="0" u="none" strike="noStrike" baseline="0" smtClean="0">
+                        <a:effectLst/>
+                      </a:rPr>
+                      <a:t>*</a:t>
+                    </a:r>
+                    <a:endParaRPr lang="en-US" dirty="0"/>
+                  </a:p>
+                </c:rich>
+              </c:tx>
+              <c:dLblPos val="t"/>
+              <c:showLegendKey val="0"/>
+              <c:showVal val="0"/>
+              <c:showCatName val="0"/>
+              <c:showSerName val="1"/>
+              <c:showPercent val="0"/>
+              <c:showBubbleSize val="0"/>
+            </c:dLbl>
+            <c:dLbl>
               <c:idx val="1"/>
               <c:delete val="1"/>
             </c:dLbl>
@@ -285,10 +320,33 @@
               <c:idx val="0"/>
               <c:layout>
                 <c:manualLayout>
-                  <c:x val="-4.5289112320021634E-2"/>
-                  <c:y val="-5.2601919008275183E-2"/>
+                  <c:x val="0.17090224002588453"/>
+                  <c:y val="-5.5340894631392114E-2"/>
                 </c:manualLayout>
               </c:layout>
+              <c:tx>
+                <c:rich>
+                  <a:bodyPr/>
+                  <a:lstStyle/>
+                  <a:p>
+                    <a:r>
+                      <a:rPr lang="en-US" dirty="0"/>
+                      <a:t>   Analysis/Software </a:t>
+                    </a:r>
+                    <a:r>
+                      <a:rPr lang="en-US" dirty="0" smtClean="0"/>
+                      <a:t>Requirements  </a:t>
+                    </a:r>
+                    <a:r>
+                      <a:rPr lang="en-US" sz="1050" b="1" i="0" u="none" strike="noStrike" baseline="0" dirty="0" smtClean="0">
+                        <a:effectLst/>
+                      </a:rPr>
+                      <a:t>‡</a:t>
+                    </a:r>
+                    <a:endParaRPr lang="en-US" dirty="0"/>
+                  </a:p>
+                </c:rich>
+              </c:tx>
               <c:dLblPos val="r"/>
               <c:showLegendKey val="0"/>
               <c:showVal val="0"/>
@@ -320,7 +378,7 @@
                   <c:v>42418</c:v>
                 </c:pt>
                 <c:pt idx="1">
-                  <c:v>42424</c:v>
+                  <c:v>42462</c:v>
                 </c:pt>
               </c:numCache>
             </c:numRef>
@@ -378,6 +436,29 @@
                   <c:y val="4.9020762297892713E-2"/>
                 </c:manualLayout>
               </c:layout>
+              <c:tx>
+                <c:rich>
+                  <a:bodyPr/>
+                  <a:lstStyle/>
+                  <a:p>
+                    <a:r>
+                      <a:rPr lang="en-US" dirty="0"/>
+                      <a:t>   Project Topic Presentation </a:t>
+                    </a:r>
+                    <a:r>
+                      <a:rPr lang="en-US" dirty="0" smtClean="0"/>
+                      <a:t>Due </a:t>
+                    </a:r>
+                    <a:r>
+                      <a:rPr lang="en-US" sz="1050" b="1" i="0" u="none" strike="noStrike" baseline="0" dirty="0" smtClean="0">
+                        <a:effectLst/>
+                      </a:rPr>
+                      <a:t>*</a:t>
+                    </a:r>
+                    <a:endParaRPr lang="en-US" dirty="0"/>
+                  </a:p>
+                </c:rich>
+              </c:tx>
               <c:dLblPos val="r"/>
               <c:showLegendKey val="0"/>
               <c:showVal val="0"/>
@@ -460,10 +541,33 @@
               <c:idx val="1"/>
               <c:layout>
                 <c:manualLayout>
-                  <c:x val="-0.2876840831878536"/>
+                  <c:x val="-0.39961293936693981"/>
                   <c:y val="-5.2602134675647054E-2"/>
                 </c:manualLayout>
               </c:layout>
+              <c:tx>
+                <c:rich>
+                  <a:bodyPr/>
+                  <a:lstStyle/>
+                  <a:p>
+                    <a:r>
+                      <a:rPr lang="en-US" dirty="0"/>
+                      <a:t>   Design, Development, &amp; Testing in four 2-week </a:t>
+                    </a:r>
+                    <a:r>
+                      <a:rPr lang="en-US" dirty="0" smtClean="0"/>
+                      <a:t>sprints </a:t>
+                    </a:r>
+                    <a:r>
+                      <a:rPr lang="en-US" sz="1050" b="1" i="0" u="none" strike="noStrike" baseline="0" dirty="0" smtClean="0">
+                        <a:effectLst/>
+                      </a:rPr>
+                      <a:t>†</a:t>
+                    </a:r>
+                    <a:endParaRPr lang="en-US" dirty="0"/>
+                  </a:p>
+                </c:rich>
+              </c:tx>
               <c:dLblPos val="r"/>
               <c:showLegendKey val="0"/>
               <c:showVal val="0"/>
@@ -631,6 +735,29 @@
                   <c:y val="-4.1365433264966778E-2"/>
                 </c:manualLayout>
               </c:layout>
+              <c:tx>
+                <c:rich>
+                  <a:bodyPr/>
+                  <a:lstStyle/>
+                  <a:p>
+                    <a:r>
+                      <a:rPr lang="en-US" dirty="0"/>
+                      <a:t>   </a:t>
+                    </a:r>
+                    <a:r>
+                      <a:rPr lang="en-US" dirty="0" smtClean="0"/>
+                      <a:t>Documentation </a:t>
+                    </a:r>
+                    <a:r>
+                      <a:rPr lang="en-US" sz="1050" b="1" i="0" u="none" strike="noStrike" baseline="0" dirty="0" smtClean="0">
+                        <a:effectLst/>
+                      </a:rPr>
+                      <a:t>‡</a:t>
+                    </a:r>
+                    <a:endParaRPr lang="en-US" dirty="0"/>
+                  </a:p>
+                </c:rich>
+              </c:tx>
               <c:dLblPos val="r"/>
               <c:showLegendKey val="0"/>
               <c:showVal val="0"/>
@@ -802,6 +929,29 @@
                   <c:y val="-3.8626457641849819E-2"/>
                 </c:manualLayout>
               </c:layout>
+              <c:tx>
+                <c:rich>
+                  <a:bodyPr/>
+                  <a:lstStyle/>
+                  <a:p>
+                    <a:r>
+                      <a:rPr lang="en-US" dirty="0"/>
+                      <a:t>   </a:t>
+                    </a:r>
+                    <a:r>
+                      <a:rPr lang="en-US" dirty="0" smtClean="0"/>
+                      <a:t>Deployment </a:t>
+                    </a:r>
+                    <a:r>
+                      <a:rPr lang="en-US" sz="1050" b="1" i="0" u="none" strike="noStrike" baseline="0" dirty="0" smtClean="0">
+                        <a:effectLst/>
+                      </a:rPr>
+                      <a:t>*</a:t>
+                    </a:r>
+                    <a:endParaRPr lang="en-US" dirty="0"/>
+                  </a:p>
+                </c:rich>
+              </c:tx>
               <c:dLblPos val="r"/>
               <c:showLegendKey val="0"/>
               <c:showVal val="0"/>
@@ -884,6 +1034,44 @@
               <c:idx val="0"/>
               <c:delete val="1"/>
             </c:dLbl>
+            <c:dLbl>
+              <c:idx val="1"/>
+              <c:layout/>
+              <c:tx>
+                <c:rich>
+                  <a:bodyPr/>
+                  <a:lstStyle/>
+                  <a:p>
+                    <a:r>
+                      <a:rPr lang="en-US"/>
+                      <a:t>   Post </a:t>
+                    </a:r>
+                    <a:r>
+                      <a:rPr lang="en-US"/>
+                      <a:t>Implementation </a:t>
+                    </a:r>
+                    <a:r>
+                      <a:rPr lang="en-US" smtClean="0"/>
+                      <a:t>Review </a:t>
+                    </a:r>
+                    <a:r>
+                      <a:rPr lang="en-US" sz="1050" b="1" i="0" u="none" strike="noStrike" baseline="0" smtClean="0">
+                        <a:effectLst/>
+                      </a:rPr>
+                      <a:t>*</a:t>
+                    </a:r>
+                    <a:endParaRPr lang="en-US"/>
+                  </a:p>
+                </c:rich>
+              </c:tx>
+              <c:dLblPos val="t"/>
+              <c:showLegendKey val="0"/>
+              <c:showVal val="0"/>
+              <c:showCatName val="0"/>
+              <c:showSerName val="1"/>
+              <c:showPercent val="0"/>
+              <c:showBubbleSize val="0"/>
+            </c:dLbl>
             <c:dLblPos val="t"/>
             <c:showLegendKey val="0"/>
             <c:showVal val="0"/>
@@ -962,6 +1150,29 @@
                   <c:y val="4.3542811051658803E-2"/>
                 </c:manualLayout>
               </c:layout>
+              <c:tx>
+                <c:rich>
+                  <a:bodyPr/>
+                  <a:lstStyle/>
+                  <a:p>
+                    <a:r>
+                      <a:rPr lang="en-US" dirty="0"/>
+                      <a:t>   Project </a:t>
+                    </a:r>
+                    <a:r>
+                      <a:rPr lang="en-US" dirty="0" smtClean="0"/>
+                      <a:t>Due </a:t>
+                    </a:r>
+                    <a:r>
+                      <a:rPr lang="en-US" sz="1050" b="1" i="0" u="none" strike="noStrike" baseline="0" dirty="0" smtClean="0">
+                        <a:effectLst/>
+                      </a:rPr>
+                      <a:t>*</a:t>
+                    </a:r>
+                    <a:endParaRPr lang="en-US" dirty="0"/>
+                  </a:p>
+                </c:rich>
+              </c:tx>
               <c:dLblPos val="r"/>
               <c:showLegendKey val="0"/>
               <c:showVal val="0"/>
@@ -1024,11 +1235,11 @@
           <c:showPercent val="0"/>
           <c:showBubbleSize val="0"/>
         </c:dLbls>
-        <c:axId val="82565312"/>
-        <c:axId val="82565888"/>
+        <c:axId val="35742848"/>
+        <c:axId val="89384064"/>
       </c:scatterChart>
       <c:valAx>
-        <c:axId val="82565312"/>
+        <c:axId val="35742848"/>
         <c:scaling>
           <c:orientation val="minMax"/>
         </c:scaling>
@@ -1043,17 +1254,17 @@
           <a:lstStyle/>
           <a:p>
             <a:pPr>
-              <a:defRPr sz="1100"/>
+              <a:defRPr/>
             </a:pPr>
             <a:endParaRPr lang="en-US"/>
           </a:p>
         </c:txPr>
-        <c:crossAx val="82565888"/>
+        <c:crossAx val="89384064"/>
         <c:crosses val="autoZero"/>
         <c:crossBetween val="midCat"/>
       </c:valAx>
       <c:valAx>
-        <c:axId val="82565888"/>
+        <c:axId val="89384064"/>
         <c:scaling>
           <c:orientation val="minMax"/>
         </c:scaling>
@@ -1070,7 +1281,7 @@
         <c:majorTickMark val="out"/>
         <c:minorTickMark val="none"/>
         <c:tickLblPos val="nextTo"/>
-        <c:crossAx val="82565312"/>
+        <c:crossAx val="35742848"/>
         <c:crosses val="autoZero"/>
         <c:crossBetween val="midCat"/>
       </c:valAx>
@@ -1090,7 +1301,7 @@
     <a:lstStyle/>
     <a:p>
       <a:pPr>
-        <a:defRPr b="1"/>
+        <a:defRPr sz="1050" b="1"/>
       </a:pPr>
       <a:endParaRPr lang="en-US"/>
     </a:p>
@@ -1099,15 +1310,6 @@
     <c:autoUpdate val="0"/>
   </c:externalData>
 </c:chartSpace>
-</file>
-
-<file path=ppt/comments/comment1.xml><?xml version="1.0" encoding="utf-8"?>
-<p:cmLst xmlns:a="http://schemas.openxmlformats.org/drawingml/2006/main" xmlns:r="http://schemas.openxmlformats.org/officeDocument/2006/relationships" xmlns:p="http://schemas.openxmlformats.org/presentationml/2006/main">
-  <p:cm authorId="0" dt="2016-02-15T21:47:37.497" idx="1">
-    <p:pos x="10" y="10"/>
-    <p:text>IS the APCD dictionary required if we're only concerning ourselves with the EHR and not insurance carrier systems?</p:text>
-  </p:cm>
-</p:cmLst>
 </file>
 
 <file path=ppt/notesMasters/notesMaster1.xml><?xml version="1.0" encoding="utf-8"?>
@@ -1555,7 +1757,31 @@
                 <a:ea typeface="+mn-ea"/>
                 <a:cs typeface="+mn-cs"/>
               </a:rPr>
-              <a:t> Up Team is developing an electronic health record data validation tool.  This tool will help providers verify a patient’s current list of diagnoses.  Accurate diagnosis data will insure that providers and health insurance companies are fairly compensated under the accountable care act’s risk adjustment program.</a:t>
+              <a:t> Up Team is developing an electronic health record data validation tool.  This tool will help providers verify a patient’s current list of diagnoses.  Accurate diagnosis data will insure that providers and health insurance companies are fairly compensated under the </a:t>
+            </a:r>
+            <a:r>
+              <a:rPr lang="en-US" sz="1200" kern="1200" dirty="0" smtClean="0">
+                <a:solidFill>
+                  <a:schemeClr val="tx1"/>
+                </a:solidFill>
+                <a:effectLst/>
+                <a:latin typeface="+mn-lt"/>
+                <a:ea typeface="+mn-ea"/>
+                <a:cs typeface="+mn-cs"/>
+              </a:rPr>
+              <a:t>affordable </a:t>
+            </a:r>
+            <a:r>
+              <a:rPr lang="en-US" sz="1200" kern="1200" dirty="0" smtClean="0">
+                <a:solidFill>
+                  <a:schemeClr val="tx1"/>
+                </a:solidFill>
+                <a:effectLst/>
+                <a:latin typeface="+mn-lt"/>
+                <a:ea typeface="+mn-ea"/>
+                <a:cs typeface="+mn-cs"/>
+              </a:rPr>
+              <a:t>care act’s risk adjustment program.</a:t>
             </a:r>
             <a:endParaRPr lang="en-US" dirty="0" smtClean="0"/>
           </a:p>
@@ -1670,8 +1896,41 @@
             </a:r>
             <a:r>
               <a:rPr lang="en-US" baseline="0" dirty="0" smtClean="0"/>
-              <a:t> companies to offer insurance to people with pre-existing conditions.  By only offering policies with high co-pays and high-deductibles, insurance companies can discourage ill patients from purchasing their products.  Risk adjustment reduces to incentive to risk select by transferring premiums from insurers with healthy members to those insurers who are carting for a more ill population.</a:t>
-            </a:r>
+              <a:t> companies to offer insurance to people with pre-existing conditions.  By only offering policies with high co-pays and high-deductibles, insurance companies can discourage ill patients from purchasing their products.  Risk adjustment reduces to incentive to risk select by transferring premiums from insurers with healthy members to those insurers who are caring for a more ill population.</a:t>
+            </a:r>
+            <a:endParaRPr lang="en-US" dirty="0" smtClean="0"/>
+          </a:p>
+          <a:p>
+            <a:pPr marL="0" marR="0" indent="0" algn="l" defTabSz="914400" rtl="0" eaLnBrk="1" fontAlgn="auto" latinLnBrk="0" hangingPunct="1">
+              <a:lnSpc>
+                <a:spcPct val="100000"/>
+              </a:lnSpc>
+              <a:spcBef>
+                <a:spcPts val="0"/>
+              </a:spcBef>
+              <a:spcAft>
+                <a:spcPts val="0"/>
+              </a:spcAft>
+              <a:buClrTx/>
+              <a:buSzTx/>
+              <a:buFontTx/>
+              <a:buNone/>
+              <a:tabLst/>
+              <a:defRPr/>
+            </a:pPr>
+            <a:r>
+              <a:rPr lang="en-US" dirty="0" smtClean="0"/>
+              <a:t>Risk</a:t>
+            </a:r>
+            <a:r>
+              <a:rPr lang="en-US" baseline="0" dirty="0" smtClean="0"/>
+              <a:t> </a:t>
+            </a:r>
+            <a:r>
+              <a:rPr lang="en-US" baseline="0" dirty="0" smtClean="0"/>
+              <a:t>scores are use to determine the average level of illness in an insurers population.  A diabetic with heart failure will have a risk score substantially higher than someone without any chronic conditions.  While several factors are used in the risk score calculation,  a patient’s recent diagnosis history is the most heavily-weighed factor.</a:t>
+            </a:r>
+            <a:endParaRPr lang="en-US" dirty="0" smtClean="0"/>
           </a:p>
           <a:p>
             <a:endParaRPr lang="en-US" dirty="0"/>
@@ -1704,7 +1963,7 @@
     </p:spTree>
     <p:extLst>
       <p:ext uri="{BB962C8B-B14F-4D97-AF65-F5344CB8AC3E}">
-        <p14:creationId xmlns:p14="http://schemas.microsoft.com/office/powerpoint/2010/main" val="536348893"/>
+        <p14:creationId xmlns:p14="http://schemas.microsoft.com/office/powerpoint/2010/main" val="4130622227"/>
       </p:ext>
     </p:extLst>
   </p:cSld>
@@ -1758,31 +2017,63 @@
           <a:bodyPr/>
           <a:lstStyle/>
           <a:p>
-            <a:pPr marL="0" marR="0" indent="0" algn="l" defTabSz="914400" rtl="0" eaLnBrk="1" fontAlgn="auto" latinLnBrk="0" hangingPunct="1">
-              <a:lnSpc>
-                <a:spcPct val="100000"/>
-              </a:lnSpc>
-              <a:spcBef>
-                <a:spcPts val="0"/>
-              </a:spcBef>
-              <a:spcAft>
-                <a:spcPts val="0"/>
-              </a:spcAft>
-              <a:buClrTx/>
-              <a:buSzTx/>
-              <a:buFontTx/>
-              <a:buNone/>
-              <a:tabLst/>
-              <a:defRPr/>
-            </a:pPr>
+            <a:r>
+              <a:rPr lang="en-US" sz="1200" dirty="0" smtClean="0"/>
+              <a:t>If a member has an illness, but the diagnosis code is not reported to the insurance carrier during the calendar year, their risk score will be artificially low.</a:t>
+            </a:r>
+          </a:p>
+          <a:p>
+            <a:r>
+              <a:rPr lang="en-US" sz="1200" dirty="0" smtClean="0"/>
+              <a:t>This data quality issue can substantially reduce an insured's premiums.  When provider payments are on a percent-of-premium basis, it also reduces payments to hospitals and doctors. </a:t>
+            </a:r>
+          </a:p>
+          <a:p>
+            <a:r>
+              <a:rPr lang="en-US" sz="1200" dirty="0" smtClean="0"/>
+              <a:t>As doctors and hospitals move to a pay-for-performance structure, correct risk assessment and diagnostic codes ensure appropriate payment for treatment of patients with multiple chronic diseases.</a:t>
+            </a:r>
+            <a:endParaRPr lang="en-US" dirty="0" smtClean="0"/>
+          </a:p>
+          <a:p>
+            <a:endParaRPr lang="en-US" dirty="0" smtClean="0"/>
+          </a:p>
+          <a:p>
+            <a:endParaRPr lang="en-US" dirty="0" smtClean="0"/>
+          </a:p>
+          <a:p>
+            <a:endParaRPr lang="en-US" dirty="0" smtClean="0"/>
+          </a:p>
+          <a:p>
+            <a:endParaRPr lang="en-US" dirty="0" smtClean="0"/>
+          </a:p>
+          <a:p>
             <a:r>
               <a:rPr lang="en-US" dirty="0" smtClean="0"/>
-              <a:t>Risk</a:t>
+              <a:t>In </a:t>
+            </a:r>
+            <a:r>
+              <a:rPr lang="en-US" dirty="0" smtClean="0"/>
+              <a:t>2015, 61</a:t>
             </a:r>
             <a:r>
               <a:rPr lang="en-US" baseline="0" dirty="0" smtClean="0"/>
-              <a:t> scores are use to determine the average level of illness in an insurers population.  A diabetic with heart failure will have a risk score substantially higher than someone without any chronic conditions.  While several factors are used in the risk score calculation,  a patient’s recent diagnosis history is the most heavily-weighed factor.</a:t>
-            </a:r>
+              <a:t> million dollars of premium was transferred between Massachusetts insurance companies.  Blue Cross, the states largest health insurance organization, received a 51 million dollars payment.  Many smaller insurance companies argued that better data quality, rather than a sicker population, contributed to this large transfer of fund to blue cross.  Fallon Health, a small insurance company that paid 11 million dollars, is an example of a company that has a strong interest in better data quality.</a:t>
+            </a:r>
+          </a:p>
+          <a:p>
+            <a:endParaRPr lang="en-US" baseline="0" dirty="0" smtClean="0"/>
+          </a:p>
+          <a:p>
+            <a:endParaRPr lang="en-US" baseline="0" dirty="0" smtClean="0"/>
+          </a:p>
+          <a:p>
+            <a:r>
+              <a:rPr lang="en-US" baseline="0" dirty="0" smtClean="0"/>
+              <a:t>Source:  http://www.masslive.com/news/index.ssf/2015/07/health_new_englands_26_million_risk_adjustment_fee_less_than_expected.html</a:t>
+            </a:r>
+          </a:p>
+          <a:p>
             <a:endParaRPr lang="en-US" dirty="0" smtClean="0"/>
           </a:p>
           <a:p>
@@ -1816,7 +2107,7 @@
     </p:spTree>
     <p:extLst>
       <p:ext uri="{BB962C8B-B14F-4D97-AF65-F5344CB8AC3E}">
-        <p14:creationId xmlns:p14="http://schemas.microsoft.com/office/powerpoint/2010/main" val="4130622227"/>
+        <p14:creationId xmlns:p14="http://schemas.microsoft.com/office/powerpoint/2010/main" val="3004013917"/>
       </p:ext>
     </p:extLst>
   </p:cSld>
@@ -1870,28 +2161,82 @@
           <a:bodyPr/>
           <a:lstStyle/>
           <a:p>
+            <a:pPr marL="0" marR="0" indent="0" algn="l" defTabSz="914400" rtl="0" eaLnBrk="1" fontAlgn="auto" latinLnBrk="0" hangingPunct="1">
+              <a:lnSpc>
+                <a:spcPct val="100000"/>
+              </a:lnSpc>
+              <a:spcBef>
+                <a:spcPts val="0"/>
+              </a:spcBef>
+              <a:spcAft>
+                <a:spcPts val="0"/>
+              </a:spcAft>
+              <a:buClrTx/>
+              <a:buSzTx/>
+              <a:buFontTx/>
+              <a:buNone/>
+              <a:tabLst/>
+              <a:defRPr/>
+            </a:pPr>
             <a:r>
               <a:rPr lang="en-US" dirty="0" smtClean="0"/>
-              <a:t>In 2015, 61</a:t>
+              <a:t>Here is an example from BCBS of Alabama.</a:t>
+            </a:r>
+          </a:p>
+          <a:p>
+            <a:pPr marL="0" marR="0" indent="0" algn="l" defTabSz="914400" rtl="0" eaLnBrk="1" fontAlgn="auto" latinLnBrk="0" hangingPunct="1">
+              <a:lnSpc>
+                <a:spcPct val="100000"/>
+              </a:lnSpc>
+              <a:spcBef>
+                <a:spcPts val="0"/>
+              </a:spcBef>
+              <a:spcAft>
+                <a:spcPts val="0"/>
+              </a:spcAft>
+              <a:buClrTx/>
+              <a:buSzTx/>
+              <a:buFontTx/>
+              <a:buNone/>
+              <a:tabLst/>
+              <a:defRPr/>
+            </a:pPr>
+            <a:endParaRPr lang="en-US" dirty="0" smtClean="0"/>
+          </a:p>
+          <a:p>
+            <a:pPr marL="0" marR="0" indent="0" algn="l" defTabSz="914400" rtl="0" eaLnBrk="1" fontAlgn="auto" latinLnBrk="0" hangingPunct="1">
+              <a:lnSpc>
+                <a:spcPct val="100000"/>
+              </a:lnSpc>
+              <a:spcBef>
+                <a:spcPts val="0"/>
+              </a:spcBef>
+              <a:spcAft>
+                <a:spcPts val="0"/>
+              </a:spcAft>
+              <a:buClrTx/>
+              <a:buSzTx/>
+              <a:buFontTx/>
+              <a:buNone/>
+              <a:tabLst/>
+              <a:defRPr/>
+            </a:pPr>
+            <a:r>
+              <a:rPr lang="en-US" dirty="0" smtClean="0"/>
+              <a:t>One doctor, Holly Lofton, MD,</a:t>
             </a:r>
             <a:r>
               <a:rPr lang="en-US" baseline="0" dirty="0" smtClean="0"/>
-              <a:t> million dollars of premium was transferred between Massachusetts insurance companies.  Blue Cross, the states largest health insurance organization, received a 51 million dollars payment.  Many smaller insurance companies argued that better data quality, rather than a sicker population, contributed to this large transfer of fund to blue cross.  Fallon Health, a small insurance company that paid 11 million dollars, is an example of a company that has a strong interest in better data quality.</a:t>
-            </a:r>
-          </a:p>
-          <a:p>
-            <a:endParaRPr lang="en-US" baseline="0" dirty="0" smtClean="0"/>
-          </a:p>
-          <a:p>
-            <a:endParaRPr lang="en-US" baseline="0" dirty="0" smtClean="0"/>
-          </a:p>
-          <a:p>
+              <a:t> </a:t>
+            </a:r>
+            <a:r>
+              <a:rPr lang="en-US" dirty="0" smtClean="0"/>
+              <a:t>Director, Medical Weight Management Program at NYU School of Medicine said many of her patients suffer from several chronic diseases due to</a:t>
+            </a:r>
             <a:r>
               <a:rPr lang="en-US" baseline="0" dirty="0" smtClean="0"/>
-              <a:t>Source:  http://www.masslive.com/news/index.ssf/2015/07/health_new_englands_26_million_risk_adjustment_fee_less_than_expected.html</a:t>
-            </a:r>
-          </a:p>
-          <a:p>
+              <a:t> their obesity, but if they don’t receive treatment regularly or are not part of the same medical system, this may not be documented system and, without special attention from the doctors, result in a lower risk score, poor care coordination, and incomplete treatment. </a:t>
+            </a:r>
             <a:endParaRPr lang="en-US" dirty="0" smtClean="0"/>
           </a:p>
           <a:p>
@@ -1925,7 +2270,271 @@
     </p:spTree>
     <p:extLst>
       <p:ext uri="{BB962C8B-B14F-4D97-AF65-F5344CB8AC3E}">
-        <p14:creationId xmlns:p14="http://schemas.microsoft.com/office/powerpoint/2010/main" val="3004013917"/>
+        <p14:creationId xmlns:p14="http://schemas.microsoft.com/office/powerpoint/2010/main" val="4202869564"/>
+      </p:ext>
+    </p:extLst>
+  </p:cSld>
+  <p:clrMapOvr>
+    <a:masterClrMapping/>
+  </p:clrMapOvr>
+</p:notes>
+</file>
+
+<file path=ppt/notesSlides/notesSlide5.xml><?xml version="1.0" encoding="utf-8"?>
+<p:notes xmlns:a="http://schemas.openxmlformats.org/drawingml/2006/main" xmlns:r="http://schemas.openxmlformats.org/officeDocument/2006/relationships" xmlns:p="http://schemas.openxmlformats.org/presentationml/2006/main">
+  <p:cSld>
+    <p:spTree>
+      <p:nvGrpSpPr>
+        <p:cNvPr id="1" name=""/>
+        <p:cNvGrpSpPr/>
+        <p:nvPr/>
+      </p:nvGrpSpPr>
+      <p:grpSpPr>
+        <a:xfrm>
+          <a:off x="0" y="0"/>
+          <a:ext cx="0" cy="0"/>
+          <a:chOff x="0" y="0"/>
+          <a:chExt cx="0" cy="0"/>
+        </a:xfrm>
+      </p:grpSpPr>
+      <p:sp>
+        <p:nvSpPr>
+          <p:cNvPr id="2" name="Slide Image Placeholder 1"/>
+          <p:cNvSpPr>
+            <a:spLocks noGrp="1" noRot="1" noChangeAspect="1"/>
+          </p:cNvSpPr>
+          <p:nvPr>
+            <p:ph type="sldImg"/>
+          </p:nvPr>
+        </p:nvSpPr>
+        <p:spPr/>
+      </p:sp>
+      <p:sp>
+        <p:nvSpPr>
+          <p:cNvPr id="3" name="Notes Placeholder 2"/>
+          <p:cNvSpPr>
+            <a:spLocks noGrp="1"/>
+          </p:cNvSpPr>
+          <p:nvPr>
+            <p:ph type="body" idx="1"/>
+          </p:nvPr>
+        </p:nvSpPr>
+        <p:spPr/>
+        <p:txBody>
+          <a:bodyPr/>
+          <a:lstStyle/>
+          <a:p>
+            <a:r>
+              <a:rPr lang="en-US" dirty="0" smtClean="0"/>
+              <a:t>Read slide</a:t>
+            </a:r>
+            <a:endParaRPr lang="en-US" dirty="0"/>
+          </a:p>
+        </p:txBody>
+      </p:sp>
+      <p:sp>
+        <p:nvSpPr>
+          <p:cNvPr id="4" name="Slide Number Placeholder 3"/>
+          <p:cNvSpPr>
+            <a:spLocks noGrp="1"/>
+          </p:cNvSpPr>
+          <p:nvPr>
+            <p:ph type="sldNum" sz="quarter" idx="10"/>
+          </p:nvPr>
+        </p:nvSpPr>
+        <p:spPr/>
+        <p:txBody>
+          <a:bodyPr/>
+          <a:lstStyle/>
+          <a:p>
+            <a:fld id="{D6E8E348-4276-4901-9134-F56B00F67743}" type="slidenum">
+              <a:rPr lang="en-US" smtClean="0"/>
+              <a:t>5</a:t>
+            </a:fld>
+            <a:endParaRPr lang="en-US"/>
+          </a:p>
+        </p:txBody>
+      </p:sp>
+    </p:spTree>
+    <p:extLst>
+      <p:ext uri="{BB962C8B-B14F-4D97-AF65-F5344CB8AC3E}">
+        <p14:creationId xmlns:p14="http://schemas.microsoft.com/office/powerpoint/2010/main" val="4225371429"/>
+      </p:ext>
+    </p:extLst>
+  </p:cSld>
+  <p:clrMapOvr>
+    <a:masterClrMapping/>
+  </p:clrMapOvr>
+</p:notes>
+</file>
+
+<file path=ppt/notesSlides/notesSlide6.xml><?xml version="1.0" encoding="utf-8"?>
+<p:notes xmlns:a="http://schemas.openxmlformats.org/drawingml/2006/main" xmlns:r="http://schemas.openxmlformats.org/officeDocument/2006/relationships" xmlns:p="http://schemas.openxmlformats.org/presentationml/2006/main">
+  <p:cSld>
+    <p:spTree>
+      <p:nvGrpSpPr>
+        <p:cNvPr id="1" name=""/>
+        <p:cNvGrpSpPr/>
+        <p:nvPr/>
+      </p:nvGrpSpPr>
+      <p:grpSpPr>
+        <a:xfrm>
+          <a:off x="0" y="0"/>
+          <a:ext cx="0" cy="0"/>
+          <a:chOff x="0" y="0"/>
+          <a:chExt cx="0" cy="0"/>
+        </a:xfrm>
+      </p:grpSpPr>
+      <p:sp>
+        <p:nvSpPr>
+          <p:cNvPr id="2" name="Slide Image Placeholder 1"/>
+          <p:cNvSpPr>
+            <a:spLocks noGrp="1" noRot="1" noChangeAspect="1"/>
+          </p:cNvSpPr>
+          <p:nvPr>
+            <p:ph type="sldImg"/>
+          </p:nvPr>
+        </p:nvSpPr>
+        <p:spPr/>
+      </p:sp>
+      <p:sp>
+        <p:nvSpPr>
+          <p:cNvPr id="3" name="Notes Placeholder 2"/>
+          <p:cNvSpPr>
+            <a:spLocks noGrp="1"/>
+          </p:cNvSpPr>
+          <p:nvPr>
+            <p:ph type="body" idx="1"/>
+          </p:nvPr>
+        </p:nvSpPr>
+        <p:spPr/>
+        <p:txBody>
+          <a:bodyPr/>
+          <a:lstStyle/>
+          <a:p>
+            <a:r>
+              <a:rPr lang="en-US" dirty="0" smtClean="0"/>
+              <a:t>Walk through process map</a:t>
+            </a:r>
+            <a:endParaRPr lang="en-US" dirty="0"/>
+          </a:p>
+        </p:txBody>
+      </p:sp>
+      <p:sp>
+        <p:nvSpPr>
+          <p:cNvPr id="4" name="Slide Number Placeholder 3"/>
+          <p:cNvSpPr>
+            <a:spLocks noGrp="1"/>
+          </p:cNvSpPr>
+          <p:nvPr>
+            <p:ph type="sldNum" sz="quarter" idx="10"/>
+          </p:nvPr>
+        </p:nvSpPr>
+        <p:spPr/>
+        <p:txBody>
+          <a:bodyPr/>
+          <a:lstStyle/>
+          <a:p>
+            <a:fld id="{D6E8E348-4276-4901-9134-F56B00F67743}" type="slidenum">
+              <a:rPr lang="en-US" smtClean="0"/>
+              <a:t>7</a:t>
+            </a:fld>
+            <a:endParaRPr lang="en-US"/>
+          </a:p>
+        </p:txBody>
+      </p:sp>
+    </p:spTree>
+    <p:extLst>
+      <p:ext uri="{BB962C8B-B14F-4D97-AF65-F5344CB8AC3E}">
+        <p14:creationId xmlns:p14="http://schemas.microsoft.com/office/powerpoint/2010/main" val="707504283"/>
+      </p:ext>
+    </p:extLst>
+  </p:cSld>
+  <p:clrMapOvr>
+    <a:masterClrMapping/>
+  </p:clrMapOvr>
+</p:notes>
+</file>
+
+<file path=ppt/notesSlides/notesSlide7.xml><?xml version="1.0" encoding="utf-8"?>
+<p:notes xmlns:a="http://schemas.openxmlformats.org/drawingml/2006/main" xmlns:r="http://schemas.openxmlformats.org/officeDocument/2006/relationships" xmlns:p="http://schemas.openxmlformats.org/presentationml/2006/main">
+  <p:cSld>
+    <p:spTree>
+      <p:nvGrpSpPr>
+        <p:cNvPr id="1" name=""/>
+        <p:cNvGrpSpPr/>
+        <p:nvPr/>
+      </p:nvGrpSpPr>
+      <p:grpSpPr>
+        <a:xfrm>
+          <a:off x="0" y="0"/>
+          <a:ext cx="0" cy="0"/>
+          <a:chOff x="0" y="0"/>
+          <a:chExt cx="0" cy="0"/>
+        </a:xfrm>
+      </p:grpSpPr>
+      <p:sp>
+        <p:nvSpPr>
+          <p:cNvPr id="2" name="Slide Image Placeholder 1"/>
+          <p:cNvSpPr>
+            <a:spLocks noGrp="1" noRot="1" noChangeAspect="1"/>
+          </p:cNvSpPr>
+          <p:nvPr>
+            <p:ph type="sldImg"/>
+          </p:nvPr>
+        </p:nvSpPr>
+        <p:spPr/>
+      </p:sp>
+      <p:sp>
+        <p:nvSpPr>
+          <p:cNvPr id="3" name="Notes Placeholder 2"/>
+          <p:cNvSpPr>
+            <a:spLocks noGrp="1"/>
+          </p:cNvSpPr>
+          <p:nvPr>
+            <p:ph type="body" idx="1"/>
+          </p:nvPr>
+        </p:nvSpPr>
+        <p:spPr/>
+        <p:txBody>
+          <a:bodyPr/>
+          <a:lstStyle/>
+          <a:p>
+            <a:r>
+              <a:rPr lang="en-US" dirty="0" smtClean="0"/>
+              <a:t>IS the APCD dictionary required if we're only concerning ourselves with the EHR and not insurance carrier systems?</a:t>
+            </a:r>
+            <a:endParaRPr lang="en-US" dirty="0"/>
+          </a:p>
+        </p:txBody>
+      </p:sp>
+      <p:sp>
+        <p:nvSpPr>
+          <p:cNvPr id="4" name="Slide Number Placeholder 3"/>
+          <p:cNvSpPr>
+            <a:spLocks noGrp="1"/>
+          </p:cNvSpPr>
+          <p:nvPr>
+            <p:ph type="sldNum" sz="quarter" idx="10"/>
+          </p:nvPr>
+        </p:nvSpPr>
+        <p:spPr/>
+        <p:txBody>
+          <a:bodyPr/>
+          <a:lstStyle/>
+          <a:p>
+            <a:fld id="{D6E8E348-4276-4901-9134-F56B00F67743}" type="slidenum">
+              <a:rPr lang="en-US" smtClean="0"/>
+              <a:t>9</a:t>
+            </a:fld>
+            <a:endParaRPr lang="en-US"/>
+          </a:p>
+        </p:txBody>
+      </p:sp>
+    </p:spTree>
+    <p:extLst>
+      <p:ext uri="{BB962C8B-B14F-4D97-AF65-F5344CB8AC3E}">
+        <p14:creationId xmlns:p14="http://schemas.microsoft.com/office/powerpoint/2010/main" val="2178825378"/>
       </p:ext>
     </p:extLst>
   </p:cSld>
@@ -13643,7 +14252,7 @@
             <p:ph idx="1"/>
             <p:extLst>
               <p:ext uri="{D42A27DB-BD31-4B8C-83A1-F6EECF244321}">
-                <p14:modId xmlns:p14="http://schemas.microsoft.com/office/powerpoint/2010/main" val="2114012576"/>
+                <p14:modId xmlns:p14="http://schemas.microsoft.com/office/powerpoint/2010/main" val="2196905259"/>
               </p:ext>
             </p:extLst>
           </p:nvPr>
@@ -13814,7 +14423,7 @@
                     <a:p>
                       <a:pPr algn="l" fontAlgn="ctr"/>
                       <a:r>
-                        <a:rPr lang="en-US" sz="1400" b="1" u="none" strike="noStrike">
+                        <a:rPr lang="en-US" sz="1400" b="1" u="none" strike="noStrike" dirty="0">
                           <a:solidFill>
                             <a:schemeClr val="tx2"/>
                           </a:solidFill>
@@ -13822,7 +14431,7 @@
                         </a:rPr>
                         <a:t>3 days</a:t>
                       </a:r>
-                      <a:endParaRPr lang="en-US" sz="1400" b="1" i="0" u="none" strike="noStrike">
+                      <a:endParaRPr lang="en-US" sz="1400" b="1" i="0" u="none" strike="noStrike" dirty="0">
                         <a:solidFill>
                           <a:schemeClr val="tx2"/>
                         </a:solidFill>
@@ -13928,15 +14537,24 @@
                     <a:p>
                       <a:pPr algn="l" fontAlgn="ctr"/>
                       <a:r>
-                        <a:rPr lang="en-US" sz="1400" b="1" u="none" strike="noStrike">
+                        <a:rPr lang="en-US" sz="1400" b="1" u="none" strike="noStrike" dirty="0" smtClean="0">
                           <a:solidFill>
                             <a:schemeClr val="tx2"/>
                           </a:solidFill>
                           <a:effectLst/>
                         </a:rPr>
-                        <a:t>7 days</a:t>
+                        <a:t>50 </a:t>
                       </a:r>
-                      <a:endParaRPr lang="en-US" sz="1400" b="1" i="0" u="none" strike="noStrike">
+                      <a:r>
+                        <a:rPr lang="en-US" sz="1400" b="1" u="none" strike="noStrike" dirty="0">
+                          <a:solidFill>
+                            <a:schemeClr val="tx2"/>
+                          </a:solidFill>
+                          <a:effectLst/>
+                        </a:rPr>
+                        <a:t>days</a:t>
+                      </a:r>
+                      <a:endParaRPr lang="en-US" sz="1400" b="1" i="0" u="none" strike="noStrike" dirty="0">
                         <a:solidFill>
                           <a:schemeClr val="tx2"/>
                         </a:solidFill>
@@ -13982,22 +14600,26 @@
                     <a:bodyPr/>
                     <a:lstStyle/>
                     <a:p>
-                      <a:pPr algn="l" fontAlgn="ctr"/>
                       <a:r>
-                        <a:rPr lang="en-US" sz="1400" b="1" u="none" strike="noStrike">
+                        <a:rPr lang="en-US" sz="1400" b="1" kern="1200" dirty="0" smtClean="0">
                           <a:solidFill>
                             <a:schemeClr val="tx2"/>
                           </a:solidFill>
                           <a:effectLst/>
+                          <a:latin typeface="+mn-lt"/>
+                          <a:ea typeface="+mn-ea"/>
+                          <a:cs typeface="+mn-cs"/>
                         </a:rPr>
-                        <a:t>Wed 2/24/16</a:t>
+                        <a:t>Sat 4/2/16</a:t>
                       </a:r>
-                      <a:endParaRPr lang="en-US" sz="1400" b="1" i="0" u="none" strike="noStrike">
+                      <a:endParaRPr lang="en-US" sz="1400" kern="1200" dirty="0">
                         <a:solidFill>
                           <a:schemeClr val="tx2"/>
                         </a:solidFill>
                         <a:effectLst/>
-                        <a:latin typeface="Calibri"/>
+                        <a:latin typeface="+mn-lt"/>
+                        <a:ea typeface="+mn-ea"/>
+                        <a:cs typeface="+mn-cs"/>
                       </a:endParaRPr>
                     </a:p>
                   </a:txBody>
@@ -14098,7 +14720,7 @@
                     <a:p>
                       <a:pPr algn="l" fontAlgn="ctr"/>
                       <a:r>
-                        <a:rPr lang="en-US" sz="1400" b="1" u="none" strike="noStrike">
+                        <a:rPr lang="en-US" sz="1400" b="1" u="none" strike="noStrike" dirty="0">
                           <a:solidFill>
                             <a:schemeClr val="tx2"/>
                           </a:solidFill>
@@ -14106,7 +14728,7 @@
                         </a:rPr>
                         <a:t>Sun 2/21/16</a:t>
                       </a:r>
-                      <a:endParaRPr lang="en-US" sz="1400" b="1" i="0" u="none" strike="noStrike">
+                      <a:endParaRPr lang="en-US" sz="1400" b="1" i="0" u="none" strike="noStrike" dirty="0">
                         <a:solidFill>
                           <a:schemeClr val="tx2"/>
                         </a:solidFill>
@@ -14156,7 +14778,7 @@
                     <a:p>
                       <a:pPr algn="l" fontAlgn="ctr"/>
                       <a:r>
-                        <a:rPr lang="en-US" sz="1400" b="1" u="none" strike="noStrike">
+                        <a:rPr lang="en-US" sz="1400" b="1" u="none" strike="noStrike" dirty="0">
                           <a:solidFill>
                             <a:schemeClr val="tx2"/>
                           </a:solidFill>
@@ -14164,7 +14786,7 @@
                         </a:rPr>
                         <a:t>56 days</a:t>
                       </a:r>
-                      <a:endParaRPr lang="en-US" sz="1400" b="1" i="0" u="none" strike="noStrike">
+                      <a:endParaRPr lang="en-US" sz="1400" b="1" i="0" u="none" strike="noStrike" dirty="0">
                         <a:solidFill>
                           <a:schemeClr val="tx2"/>
                         </a:solidFill>
@@ -14977,20 +15599,20 @@
       </p:sp>
       <p:graphicFrame>
         <p:nvGraphicFramePr>
-          <p:cNvPr id="4" name="Chart 3"/>
+          <p:cNvPr id="5" name="Chart 4"/>
           <p:cNvGraphicFramePr>
             <a:graphicFrameLocks/>
           </p:cNvGraphicFramePr>
           <p:nvPr>
             <p:extLst>
               <p:ext uri="{D42A27DB-BD31-4B8C-83A1-F6EECF244321}">
-                <p14:modId xmlns:p14="http://schemas.microsoft.com/office/powerpoint/2010/main" val="1755984526"/>
+                <p14:modId xmlns:p14="http://schemas.microsoft.com/office/powerpoint/2010/main" val="474100356"/>
               </p:ext>
             </p:extLst>
           </p:nvPr>
         </p:nvGraphicFramePr>
         <p:xfrm>
-          <a:off x="381000" y="1447800"/>
+          <a:off x="430530" y="1110615"/>
           <a:ext cx="8282940" cy="4636770"/>
         </p:xfrm>
         <a:graphic>
@@ -14999,10 +15621,277 @@
           </a:graphicData>
         </a:graphic>
       </p:graphicFrame>
+      <p:sp>
+        <p:nvSpPr>
+          <p:cNvPr id="3" name="TextBox 2"/>
+          <p:cNvSpPr txBox="1"/>
+          <p:nvPr/>
+        </p:nvSpPr>
+        <p:spPr>
+          <a:xfrm>
+            <a:off x="228600" y="5638800"/>
+            <a:ext cx="8534400" cy="923330"/>
+          </a:xfrm>
+          <a:prstGeom prst="rect">
+            <a:avLst/>
+          </a:prstGeom>
+          <a:noFill/>
+        </p:spPr>
+        <p:txBody>
+          <a:bodyPr wrap="square" rtlCol="0">
+            <a:spAutoFit/>
+          </a:bodyPr>
+          <a:lstStyle/>
+          <a:p>
+            <a:pPr marL="285750" indent="-285750">
+              <a:buFont typeface="Arial" charset="0"/>
+              <a:buChar char="•"/>
+            </a:pPr>
+            <a:r>
+              <a:rPr lang="en-US" dirty="0" smtClean="0"/>
+              <a:t>* - All team members involved</a:t>
+            </a:r>
+          </a:p>
+          <a:p>
+            <a:pPr marL="285750" indent="-285750">
+              <a:buFont typeface="Arial" charset="0"/>
+              <a:buChar char="•"/>
+            </a:pPr>
+            <a:r>
+              <a:rPr lang="en-US" dirty="0" smtClean="0"/>
+              <a:t>† - Developers and testers involved</a:t>
+            </a:r>
+          </a:p>
+          <a:p>
+            <a:pPr marL="285750" indent="-285750">
+              <a:buFont typeface="Arial" charset="0"/>
+              <a:buChar char="•"/>
+            </a:pPr>
+            <a:r>
+              <a:rPr lang="en-US" dirty="0" smtClean="0"/>
+              <a:t>‡ - Business Analysts involved</a:t>
+            </a:r>
+            <a:endParaRPr lang="en-US" dirty="0"/>
+          </a:p>
+        </p:txBody>
+      </p:sp>
     </p:spTree>
     <p:extLst>
       <p:ext uri="{BB962C8B-B14F-4D97-AF65-F5344CB8AC3E}">
         <p14:creationId xmlns:p14="http://schemas.microsoft.com/office/powerpoint/2010/main" val="1237183140"/>
+      </p:ext>
+    </p:extLst>
+  </p:cSld>
+  <p:clrMapOvr>
+    <a:masterClrMapping/>
+  </p:clrMapOvr>
+</p:sld>
+</file>
+
+<file path=ppt/slides/slide12.xml><?xml version="1.0" encoding="utf-8"?>
+<p:sld xmlns:a="http://schemas.openxmlformats.org/drawingml/2006/main" xmlns:r="http://schemas.openxmlformats.org/officeDocument/2006/relationships" xmlns:p="http://schemas.openxmlformats.org/presentationml/2006/main">
+  <p:cSld>
+    <p:spTree>
+      <p:nvGrpSpPr>
+        <p:cNvPr id="1" name=""/>
+        <p:cNvGrpSpPr/>
+        <p:nvPr/>
+      </p:nvGrpSpPr>
+      <p:grpSpPr>
+        <a:xfrm>
+          <a:off x="0" y="0"/>
+          <a:ext cx="0" cy="0"/>
+          <a:chOff x="0" y="0"/>
+          <a:chExt cx="0" cy="0"/>
+        </a:xfrm>
+      </p:grpSpPr>
+      <p:sp>
+        <p:nvSpPr>
+          <p:cNvPr id="2" name="Title 1"/>
+          <p:cNvSpPr>
+            <a:spLocks noGrp="1"/>
+          </p:cNvSpPr>
+          <p:nvPr>
+            <p:ph type="title"/>
+          </p:nvPr>
+        </p:nvSpPr>
+        <p:spPr/>
+        <p:txBody>
+          <a:bodyPr/>
+          <a:lstStyle/>
+          <a:p>
+            <a:r>
+              <a:rPr lang="en-US" dirty="0" smtClean="0"/>
+              <a:t>References</a:t>
+            </a:r>
+            <a:endParaRPr lang="en-US" dirty="0"/>
+          </a:p>
+        </p:txBody>
+      </p:sp>
+      <p:sp>
+        <p:nvSpPr>
+          <p:cNvPr id="3" name="Content Placeholder 2"/>
+          <p:cNvSpPr>
+            <a:spLocks noGrp="1"/>
+          </p:cNvSpPr>
+          <p:nvPr>
+            <p:ph idx="1"/>
+          </p:nvPr>
+        </p:nvSpPr>
+        <p:spPr>
+          <a:xfrm>
+            <a:off x="685800" y="2057400"/>
+            <a:ext cx="7772400" cy="4114800"/>
+          </a:xfrm>
+        </p:spPr>
+        <p:txBody>
+          <a:bodyPr/>
+          <a:lstStyle/>
+          <a:p>
+            <a:r>
+              <a:rPr lang="en-US" sz="2000" dirty="0" smtClean="0">
+                <a:effectLst>
+                  <a:outerShdw blurRad="38100" dist="38100" dir="2700000" algn="tl">
+                    <a:srgbClr val="000000">
+                      <a:alpha val="43137"/>
+                    </a:srgbClr>
+                  </a:outerShdw>
+                </a:effectLst>
+              </a:rPr>
+              <a:t>Class Lectures</a:t>
+            </a:r>
+          </a:p>
+          <a:p>
+            <a:r>
+              <a:rPr lang="en-US" sz="2000" u="sng" dirty="0">
+                <a:effectLst>
+                  <a:outerShdw blurRad="38100" dist="38100" dir="2700000" algn="tl">
+                    <a:srgbClr val="000000">
+                      <a:alpha val="43137"/>
+                    </a:srgbClr>
+                  </a:outerShdw>
+                </a:effectLst>
+                <a:hlinkClick r:id="rId2"/>
+              </a:rPr>
+              <a:t>https://</a:t>
+            </a:r>
+            <a:r>
+              <a:rPr lang="en-US" sz="2000" u="sng" dirty="0" smtClean="0">
+                <a:effectLst>
+                  <a:outerShdw blurRad="38100" dist="38100" dir="2700000" algn="tl">
+                    <a:srgbClr val="000000">
+                      <a:alpha val="43137"/>
+                    </a:srgbClr>
+                  </a:outerShdw>
+                </a:effectLst>
+                <a:hlinkClick r:id="rId2"/>
+              </a:rPr>
+              <a:t>www.bcbsal.org/providers/pdfs/riskAdjustment.pdf</a:t>
+            </a:r>
+            <a:endParaRPr lang="en-US" sz="2000" u="sng" dirty="0" smtClean="0">
+              <a:effectLst>
+                <a:outerShdw blurRad="38100" dist="38100" dir="2700000" algn="tl">
+                  <a:srgbClr val="000000">
+                    <a:alpha val="43137"/>
+                  </a:srgbClr>
+                </a:outerShdw>
+              </a:effectLst>
+            </a:endParaRPr>
+          </a:p>
+          <a:p>
+            <a:r>
+              <a:rPr lang="en-US" sz="2000" u="sng" dirty="0">
+                <a:effectLst>
+                  <a:outerShdw blurRad="38100" dist="38100" dir="2700000" algn="tl">
+                    <a:srgbClr val="000000">
+                      <a:alpha val="43137"/>
+                    </a:srgbClr>
+                  </a:outerShdw>
+                </a:effectLst>
+                <a:hlinkClick r:id="rId3"/>
+              </a:rPr>
+              <a:t>https://</a:t>
+            </a:r>
+            <a:r>
+              <a:rPr lang="en-US" sz="2000" u="sng" dirty="0" smtClean="0">
+                <a:effectLst>
+                  <a:outerShdw blurRad="38100" dist="38100" dir="2700000" algn="tl">
+                    <a:srgbClr val="000000">
+                      <a:alpha val="43137"/>
+                    </a:srgbClr>
+                  </a:outerShdw>
+                </a:effectLst>
+                <a:hlinkClick r:id="rId3"/>
+              </a:rPr>
+              <a:t>www.healthlawyers.org/Events/Programs/Materials/Documents/MM12/papers/EE_haley_sillman_slides.pdf</a:t>
+            </a:r>
+            <a:endParaRPr lang="en-US" sz="2000" u="sng" dirty="0" smtClean="0">
+              <a:effectLst>
+                <a:outerShdw blurRad="38100" dist="38100" dir="2700000" algn="tl">
+                  <a:srgbClr val="000000">
+                    <a:alpha val="43137"/>
+                  </a:srgbClr>
+                </a:outerShdw>
+              </a:effectLst>
+            </a:endParaRPr>
+          </a:p>
+          <a:p>
+            <a:r>
+              <a:rPr lang="en-US" sz="2000" i="1" u="sng" dirty="0">
+                <a:effectLst>
+                  <a:outerShdw blurRad="38100" dist="38100" dir="2700000" algn="tl">
+                    <a:srgbClr val="000000">
+                      <a:alpha val="43137"/>
+                    </a:srgbClr>
+                  </a:outerShdw>
+                </a:effectLst>
+                <a:hlinkClick r:id="rId4"/>
+              </a:rPr>
+              <a:t>http://</a:t>
+            </a:r>
+            <a:r>
+              <a:rPr lang="en-US" sz="2000" i="1" u="sng" dirty="0" smtClean="0">
+                <a:effectLst>
+                  <a:outerShdw blurRad="38100" dist="38100" dir="2700000" algn="tl">
+                    <a:srgbClr val="000000">
+                      <a:alpha val="43137"/>
+                    </a:srgbClr>
+                  </a:outerShdw>
+                </a:effectLst>
+                <a:hlinkClick r:id="rId4"/>
+              </a:rPr>
+              <a:t>www.modernhealthcare.com/article/20150701/NEWS/150709989</a:t>
+            </a:r>
+            <a:endParaRPr lang="en-US" sz="2000" i="1" u="sng" dirty="0" smtClean="0">
+              <a:effectLst>
+                <a:outerShdw blurRad="38100" dist="38100" dir="2700000" algn="tl">
+                  <a:srgbClr val="000000">
+                    <a:alpha val="43137"/>
+                  </a:srgbClr>
+                </a:outerShdw>
+              </a:effectLst>
+            </a:endParaRPr>
+          </a:p>
+          <a:p>
+            <a:r>
+              <a:rPr lang="en-US" sz="2000" dirty="0">
+                <a:effectLst>
+                  <a:outerShdw blurRad="38100" dist="38100" dir="2700000" algn="tl">
+                    <a:srgbClr val="000000">
+                      <a:alpha val="43137"/>
+                    </a:srgbClr>
+                  </a:outerShdw>
+                </a:effectLst>
+              </a:rPr>
+              <a:t>http://kff.org/health-reform/issue-brief/explaining-health-care-reform-risk-adjustment-reinsurance-and-risk-corridors/</a:t>
+            </a:r>
+          </a:p>
+        </p:txBody>
+      </p:sp>
+    </p:spTree>
+    <p:extLst>
+      <p:ext uri="{BB962C8B-B14F-4D97-AF65-F5344CB8AC3E}">
+        <p14:creationId xmlns:p14="http://schemas.microsoft.com/office/powerpoint/2010/main" val="2868114397"/>
       </p:ext>
     </p:extLst>
   </p:cSld>
@@ -15046,7 +15935,11 @@
           <a:p>
             <a:r>
               <a:rPr lang="en-US" dirty="0" smtClean="0"/>
-              <a:t>Background Information</a:t>
+              <a:t>Risk </a:t>
+            </a:r>
+            <a:r>
+              <a:rPr lang="en-US" dirty="0" smtClean="0"/>
+              <a:t>Scores &amp; Adjustment</a:t>
             </a:r>
             <a:endParaRPr lang="en-US" dirty="0"/>
           </a:p>
@@ -15062,45 +15955,105 @@
             <p:ph idx="1"/>
           </p:nvPr>
         </p:nvSpPr>
-        <p:spPr/>
+        <p:spPr>
+          <a:xfrm>
+            <a:off x="685800" y="1524000"/>
+            <a:ext cx="7772400" cy="4800600"/>
+          </a:xfrm>
+        </p:spPr>
         <p:txBody>
           <a:bodyPr/>
           <a:lstStyle/>
           <a:p>
             <a:r>
-              <a:rPr lang="en-US" b="1" i="1" dirty="0"/>
+              <a:rPr lang="en-US" sz="2000" b="1" i="1" dirty="0" smtClean="0"/>
+              <a:t>Risk Scores </a:t>
+            </a:r>
+            <a:r>
+              <a:rPr lang="en-US" sz="2000" dirty="0" smtClean="0"/>
+              <a:t>are an estimate of </a:t>
+            </a:r>
+            <a:r>
+              <a:rPr lang="en-US" sz="2000" dirty="0" smtClean="0"/>
+              <a:t>an individual’s </a:t>
+            </a:r>
+            <a:r>
+              <a:rPr lang="en-US" sz="2000" dirty="0" smtClean="0"/>
+              <a:t>future medical costs</a:t>
+            </a:r>
+            <a:r>
+              <a:rPr lang="en-US" sz="2000" dirty="0" smtClean="0"/>
+              <a:t>. Recent </a:t>
+            </a:r>
+            <a:r>
+              <a:rPr lang="en-US" sz="2000" dirty="0" smtClean="0"/>
+              <a:t>diagnostic history is the most important </a:t>
+            </a:r>
+            <a:r>
+              <a:rPr lang="en-US" sz="2000" dirty="0" smtClean="0"/>
+              <a:t>data in determining an </a:t>
+            </a:r>
+            <a:r>
+              <a:rPr lang="en-US" sz="2000" dirty="0" smtClean="0"/>
+              <a:t>individual’s risk score</a:t>
+            </a:r>
+            <a:r>
+              <a:rPr lang="en-US" sz="2000" dirty="0" smtClean="0"/>
+              <a:t>. Other </a:t>
+            </a:r>
+            <a:r>
+              <a:rPr lang="en-US" sz="2000" dirty="0" smtClean="0"/>
+              <a:t>predictors include the individual’s geographic area, age/gender and the type of insurance policy (high-deductible, low co-pays, etc.) </a:t>
+            </a:r>
+            <a:endParaRPr lang="en-US" sz="2000" dirty="0" smtClean="0"/>
+          </a:p>
+          <a:p>
+            <a:endParaRPr lang="en-US" sz="2000" dirty="0" smtClean="0"/>
+          </a:p>
+          <a:p>
+            <a:r>
+              <a:rPr lang="en-US" sz="2000" b="1" i="1" dirty="0"/>
               <a:t>Risk Selection </a:t>
             </a:r>
             <a:r>
-              <a:rPr lang="en-US" dirty="0"/>
-              <a:t>occurs when insures try to avoid enrolling unhealthy people by making their products unattractive to people requiring costly medical care.</a:t>
-            </a:r>
-          </a:p>
-          <a:p>
-            <a:endParaRPr lang="en-US" dirty="0"/>
-          </a:p>
-          <a:p>
-            <a:r>
-              <a:rPr lang="en-US" b="1" i="1" dirty="0"/>
+              <a:rPr lang="en-US" sz="2000" dirty="0"/>
+              <a:t>occurs when </a:t>
+            </a:r>
+            <a:r>
+              <a:rPr lang="en-US" sz="2000" dirty="0" smtClean="0"/>
+              <a:t>insurers </a:t>
+            </a:r>
+            <a:r>
+              <a:rPr lang="en-US" sz="2000" dirty="0"/>
+              <a:t>try to avoid enrolling unhealthy people by making their products unattractive to people requiring costly medical care.</a:t>
+            </a:r>
+          </a:p>
+          <a:p>
+            <a:endParaRPr lang="en-US" sz="2000" dirty="0"/>
+          </a:p>
+          <a:p>
+            <a:r>
+              <a:rPr lang="en-US" sz="2000" b="1" i="1" dirty="0"/>
               <a:t>Risk Adjustment </a:t>
             </a:r>
             <a:r>
-              <a:rPr lang="en-US" dirty="0"/>
+              <a:rPr lang="en-US" sz="2000" dirty="0"/>
               <a:t>discourages risk selection by transferring premiums from insurers with healthy members to those with members who are more ill.</a:t>
             </a:r>
-          </a:p>
-          <a:p>
-            <a:endParaRPr lang="en-US" dirty="0"/>
-          </a:p>
-          <a:p>
-            <a:endParaRPr lang="en-US" dirty="0"/>
+            <a:endParaRPr lang="en-US" sz="2000" dirty="0" smtClean="0"/>
+          </a:p>
+          <a:p>
+            <a:endParaRPr lang="en-US" sz="2000" dirty="0" smtClean="0"/>
+          </a:p>
+          <a:p>
+            <a:endParaRPr lang="en-US" sz="2000" dirty="0"/>
           </a:p>
         </p:txBody>
       </p:sp>
     </p:spTree>
     <p:extLst>
       <p:ext uri="{BB962C8B-B14F-4D97-AF65-F5344CB8AC3E}">
-        <p14:creationId xmlns:p14="http://schemas.microsoft.com/office/powerpoint/2010/main" val="424007196"/>
+        <p14:creationId xmlns:p14="http://schemas.microsoft.com/office/powerpoint/2010/main" val="3423474980"/>
       </p:ext>
     </p:extLst>
   </p:cSld>
@@ -15144,7 +16097,7 @@
           <a:p>
             <a:r>
               <a:rPr lang="en-US" dirty="0" smtClean="0"/>
-              <a:t>Risk Scores</a:t>
+              <a:t>Business Case</a:t>
             </a:r>
             <a:endParaRPr lang="en-US" dirty="0"/>
           </a:p>
@@ -15160,63 +16113,297 @@
             <p:ph idx="1"/>
           </p:nvPr>
         </p:nvSpPr>
-        <p:spPr>
-          <a:xfrm>
-            <a:off x="685800" y="1524000"/>
-            <a:ext cx="7772400" cy="4800600"/>
-          </a:xfrm>
-        </p:spPr>
+        <p:spPr/>
         <p:txBody>
           <a:bodyPr/>
           <a:lstStyle/>
           <a:p>
             <a:r>
-              <a:rPr lang="en-US" sz="2800" b="1" i="1" dirty="0" smtClean="0"/>
-              <a:t>Risk Scores </a:t>
-            </a:r>
-            <a:r>
-              <a:rPr lang="en-US" sz="2800" dirty="0" smtClean="0"/>
-              <a:t>are an estimate of a individuals future medical costs.</a:t>
-            </a:r>
-          </a:p>
-          <a:p>
-            <a:endParaRPr lang="en-US" sz="2800" dirty="0" smtClean="0"/>
-          </a:p>
-          <a:p>
-            <a:r>
-              <a:rPr lang="en-US" sz="2800" b="1" dirty="0" smtClean="0"/>
-              <a:t>Recent diagnostic history </a:t>
-            </a:r>
-            <a:r>
-              <a:rPr lang="en-US" sz="2800" dirty="0" smtClean="0"/>
-              <a:t>is the most important data individual’s risk score.</a:t>
-            </a:r>
-          </a:p>
-          <a:p>
-            <a:endParaRPr lang="en-US" sz="2800" dirty="0" smtClean="0"/>
-          </a:p>
-          <a:p>
-            <a:r>
-              <a:rPr lang="en-US" sz="2800" b="1" dirty="0" smtClean="0"/>
-              <a:t>Other predictors </a:t>
-            </a:r>
-            <a:r>
-              <a:rPr lang="en-US" sz="2800" dirty="0" smtClean="0"/>
-              <a:t>include the individual’s geographic area, age/gender and the type of insurance policy (high-deductible, low co-pays, etc.) </a:t>
-            </a:r>
-          </a:p>
-          <a:p>
-            <a:endParaRPr lang="en-US" sz="2800" dirty="0" smtClean="0"/>
-          </a:p>
-          <a:p>
-            <a:endParaRPr lang="en-US" sz="2800" dirty="0"/>
+              <a:rPr lang="en-US" sz="1800" b="1" dirty="0" smtClean="0">
+                <a:effectLst>
+                  <a:outerShdw blurRad="38100" dist="38100" dir="2700000" algn="tl">
+                    <a:srgbClr val="000000">
+                      <a:alpha val="43137"/>
+                    </a:srgbClr>
+                  </a:outerShdw>
+                </a:effectLst>
+              </a:rPr>
+              <a:t>If a member has an illness, but the diagnosis code is not reported to the insurance carrier during the calendar year, their risk score will be artificially low.</a:t>
+            </a:r>
+          </a:p>
+          <a:p>
+            <a:r>
+              <a:rPr lang="en-US" sz="1800" b="1" dirty="0" smtClean="0">
+                <a:effectLst>
+                  <a:outerShdw blurRad="38100" dist="38100" dir="2700000" algn="tl">
+                    <a:srgbClr val="000000">
+                      <a:alpha val="43137"/>
+                    </a:srgbClr>
+                  </a:outerShdw>
+                </a:effectLst>
+              </a:rPr>
+              <a:t>This data quality issue can substantially reduce an insured's premiums.  When provider payments are on a percent-of-premium basis, it also reduces payments to hospitals and doctors. </a:t>
+            </a:r>
+          </a:p>
+          <a:p>
+            <a:r>
+              <a:rPr lang="en-US" sz="1800" b="1" dirty="0" smtClean="0">
+                <a:effectLst>
+                  <a:outerShdw blurRad="38100" dist="38100" dir="2700000" algn="tl">
+                    <a:srgbClr val="000000">
+                      <a:alpha val="43137"/>
+                    </a:srgbClr>
+                  </a:outerShdw>
+                </a:effectLst>
+              </a:rPr>
+              <a:t>As doctors and hospitals move to a pay-for-performance structure, correct risk assessment and diagnostic codes ensure appropriate payment for treatment of patients with multiple chronic </a:t>
+            </a:r>
+            <a:r>
+              <a:rPr lang="en-US" sz="1800" b="1" dirty="0" smtClean="0">
+                <a:effectLst>
+                  <a:outerShdw blurRad="38100" dist="38100" dir="2700000" algn="tl">
+                    <a:srgbClr val="000000">
+                      <a:alpha val="43137"/>
+                    </a:srgbClr>
+                  </a:outerShdw>
+                </a:effectLst>
+              </a:rPr>
+              <a:t>diseases.</a:t>
+            </a:r>
+          </a:p>
+          <a:p>
+            <a:r>
+              <a:rPr lang="en-US" sz="1800" b="1" dirty="0">
+                <a:effectLst>
+                  <a:outerShdw blurRad="38100" dist="38100" dir="2700000" algn="tl">
+                    <a:srgbClr val="000000">
+                      <a:alpha val="43137"/>
+                    </a:srgbClr>
+                  </a:outerShdw>
+                </a:effectLst>
+              </a:rPr>
+              <a:t>American Health Lawyers </a:t>
+            </a:r>
+            <a:r>
+              <a:rPr lang="en-US" sz="1800" b="1" dirty="0" smtClean="0">
+                <a:effectLst>
+                  <a:outerShdw blurRad="38100" dist="38100" dir="2700000" algn="tl">
+                    <a:srgbClr val="000000">
+                      <a:alpha val="43137"/>
+                    </a:srgbClr>
+                  </a:outerShdw>
+                </a:effectLst>
+              </a:rPr>
+              <a:t>Association  lists additional benefits</a:t>
+            </a:r>
+          </a:p>
+          <a:p>
+            <a:pPr lvl="1"/>
+            <a:r>
+              <a:rPr lang="en-US" sz="1600" b="1" dirty="0">
+                <a:effectLst>
+                  <a:outerShdw blurRad="38100" dist="38100" dir="2700000" algn="tl">
+                    <a:srgbClr val="000000">
+                      <a:alpha val="43137"/>
+                    </a:srgbClr>
+                  </a:outerShdw>
+                </a:effectLst>
+              </a:rPr>
+              <a:t>Know high revenue HCCs that are often undiagnosed or </a:t>
+            </a:r>
+            <a:r>
+              <a:rPr lang="en-US" sz="1600" b="1" dirty="0" err="1">
+                <a:effectLst>
+                  <a:outerShdw blurRad="38100" dist="38100" dir="2700000" algn="tl">
+                    <a:srgbClr val="000000">
+                      <a:alpha val="43137"/>
+                    </a:srgbClr>
+                  </a:outerShdw>
+                </a:effectLst>
+              </a:rPr>
+              <a:t>undercoded</a:t>
+            </a:r>
+            <a:endParaRPr lang="en-US" sz="1600" b="1" dirty="0">
+              <a:effectLst>
+                <a:outerShdw blurRad="38100" dist="38100" dir="2700000" algn="tl">
+                  <a:srgbClr val="000000">
+                    <a:alpha val="43137"/>
+                  </a:srgbClr>
+                </a:outerShdw>
+              </a:effectLst>
+            </a:endParaRPr>
+          </a:p>
+          <a:p>
+            <a:pPr lvl="1"/>
+            <a:r>
+              <a:rPr lang="en-US" sz="1600" b="1" dirty="0">
+                <a:effectLst>
+                  <a:outerShdw blurRad="38100" dist="38100" dir="2700000" algn="tl">
+                    <a:srgbClr val="000000">
+                      <a:alpha val="43137"/>
+                    </a:srgbClr>
+                  </a:outerShdw>
+                </a:effectLst>
+              </a:rPr>
+              <a:t>Review missing diagnoses from prior years’ HCCs and send reminders to MDs</a:t>
+            </a:r>
+          </a:p>
+          <a:p>
+            <a:pPr lvl="1"/>
+            <a:r>
+              <a:rPr lang="en-US" sz="1600" b="1" dirty="0">
+                <a:effectLst>
+                  <a:outerShdw blurRad="38100" dist="38100" dir="2700000" algn="tl">
+                    <a:srgbClr val="000000">
+                      <a:alpha val="43137"/>
+                    </a:srgbClr>
+                  </a:outerShdw>
+                </a:effectLst>
+              </a:rPr>
+              <a:t>Audits of records vs. codes for missing codes: last year and this year.</a:t>
+            </a:r>
+          </a:p>
+          <a:p>
+            <a:pPr lvl="1"/>
+            <a:r>
+              <a:rPr lang="en-US" sz="1600" b="1" dirty="0">
+                <a:effectLst>
+                  <a:outerShdw blurRad="38100" dist="38100" dir="2700000" algn="tl">
+                    <a:srgbClr val="000000">
+                      <a:alpha val="43137"/>
+                    </a:srgbClr>
+                  </a:outerShdw>
+                </a:effectLst>
+              </a:rPr>
+              <a:t>Conduct annual comprehensive exams for members who have not yet been seen early in the year</a:t>
+            </a:r>
+            <a:r>
+              <a:rPr lang="en-US" sz="1600" b="1" dirty="0" smtClean="0">
+                <a:effectLst>
+                  <a:outerShdw blurRad="38100" dist="38100" dir="2700000" algn="tl">
+                    <a:srgbClr val="000000">
+                      <a:alpha val="43137"/>
+                    </a:srgbClr>
+                  </a:outerShdw>
+                </a:effectLst>
+              </a:rPr>
+              <a:t>.</a:t>
+            </a:r>
+          </a:p>
+          <a:p>
+            <a:pPr marL="457200" lvl="1" indent="0">
+              <a:buNone/>
+            </a:pPr>
+            <a:endParaRPr lang="en-US" sz="1800" b="1" dirty="0" smtClean="0">
+              <a:effectLst>
+                <a:outerShdw blurRad="38100" dist="38100" dir="2700000" algn="tl">
+                  <a:srgbClr val="000000">
+                    <a:alpha val="43137"/>
+                  </a:srgbClr>
+                </a:outerShdw>
+              </a:effectLst>
+            </a:endParaRPr>
+          </a:p>
+          <a:p>
+            <a:endParaRPr lang="en-US" sz="1800" b="1" dirty="0" smtClean="0">
+              <a:effectLst>
+                <a:outerShdw blurRad="38100" dist="38100" dir="2700000" algn="tl">
+                  <a:srgbClr val="000000">
+                    <a:alpha val="43137"/>
+                  </a:srgbClr>
+                </a:outerShdw>
+              </a:effectLst>
+            </a:endParaRPr>
+          </a:p>
+          <a:p>
+            <a:endParaRPr lang="en-US" sz="1800" b="1" dirty="0">
+              <a:effectLst>
+                <a:outerShdw blurRad="38100" dist="38100" dir="2700000" algn="tl">
+                  <a:srgbClr val="000000">
+                    <a:alpha val="43137"/>
+                  </a:srgbClr>
+                </a:outerShdw>
+              </a:effectLst>
+            </a:endParaRPr>
+          </a:p>
+        </p:txBody>
+      </p:sp>
+      <p:sp>
+        <p:nvSpPr>
+          <p:cNvPr id="4" name="TextBox 3"/>
+          <p:cNvSpPr txBox="1"/>
+          <p:nvPr/>
+        </p:nvSpPr>
+        <p:spPr>
+          <a:xfrm>
+            <a:off x="152400" y="6477000"/>
+            <a:ext cx="8991600" cy="276999"/>
+          </a:xfrm>
+          <a:prstGeom prst="rect">
+            <a:avLst/>
+          </a:prstGeom>
+          <a:noFill/>
+        </p:spPr>
+        <p:txBody>
+          <a:bodyPr wrap="square" rtlCol="0">
+            <a:spAutoFit/>
+          </a:bodyPr>
+          <a:lstStyle/>
+          <a:p>
+            <a:r>
+              <a:rPr lang="en-US" sz="1200" dirty="0" smtClean="0">
+                <a:effectLst>
+                  <a:outerShdw blurRad="38100" dist="38100" dir="2700000" algn="tl">
+                    <a:srgbClr val="000000">
+                      <a:alpha val="43137"/>
+                    </a:srgbClr>
+                  </a:outerShdw>
+                </a:effectLst>
+              </a:rPr>
+              <a:t>Source: </a:t>
+            </a:r>
+            <a:r>
+              <a:rPr lang="en-US" sz="1200" u="sng" dirty="0" smtClean="0">
+                <a:effectLst>
+                  <a:outerShdw blurRad="38100" dist="38100" dir="2700000" algn="tl">
+                    <a:srgbClr val="000000">
+                      <a:alpha val="43137"/>
+                    </a:srgbClr>
+                  </a:outerShdw>
+                </a:effectLst>
+                <a:hlinkClick r:id="rId3"/>
+              </a:rPr>
+              <a:t>https</a:t>
+            </a:r>
+            <a:r>
+              <a:rPr lang="en-US" sz="1200" u="sng" dirty="0">
+                <a:effectLst>
+                  <a:outerShdw blurRad="38100" dist="38100" dir="2700000" algn="tl">
+                    <a:srgbClr val="000000">
+                      <a:alpha val="43137"/>
+                    </a:srgbClr>
+                  </a:outerShdw>
+                </a:effectLst>
+                <a:hlinkClick r:id="rId3"/>
+              </a:rPr>
+              <a:t>://www.healthlawyers.org/Events/Programs/Materials/Documents/MM12/papers/EE_haley_sillman_slides.pdf</a:t>
+            </a:r>
+            <a:endParaRPr lang="en-US" sz="1200" dirty="0">
+              <a:effectLst>
+                <a:outerShdw blurRad="38100" dist="38100" dir="2700000" algn="tl">
+                  <a:srgbClr val="000000">
+                    <a:alpha val="43137"/>
+                  </a:srgbClr>
+                </a:outerShdw>
+              </a:effectLst>
+            </a:endParaRPr>
           </a:p>
         </p:txBody>
       </p:sp>
     </p:spTree>
     <p:extLst>
       <p:ext uri="{BB962C8B-B14F-4D97-AF65-F5344CB8AC3E}">
-        <p14:creationId xmlns:p14="http://schemas.microsoft.com/office/powerpoint/2010/main" val="3423474980"/>
+        <p14:creationId xmlns:p14="http://schemas.microsoft.com/office/powerpoint/2010/main" val="2857344511"/>
       </p:ext>
     </p:extLst>
   </p:cSld>
@@ -15276,40 +16463,239 @@
             <p:ph idx="1"/>
           </p:nvPr>
         </p:nvSpPr>
-        <p:spPr/>
+        <p:spPr>
+          <a:xfrm>
+            <a:off x="552298" y="1676400"/>
+            <a:ext cx="7772400" cy="1447800"/>
+          </a:xfrm>
+        </p:spPr>
         <p:txBody>
           <a:bodyPr/>
           <a:lstStyle/>
           <a:p>
             <a:r>
-              <a:rPr lang="en-US" sz="2400" dirty="0" smtClean="0"/>
-              <a:t>If a member has an illness, but the diagnosis code is not reported to the insurance carrier during the calendar year, their risk score will be artificially low.</a:t>
-            </a:r>
-          </a:p>
-          <a:p>
-            <a:r>
-              <a:rPr lang="en-US" sz="2400" dirty="0" smtClean="0"/>
-              <a:t>This data quality issue can substantially reduce an insured's premiums.  When provider payments are on a percent-of-premium basis, it also reduces payments to hospitals and doctors. </a:t>
-            </a:r>
-          </a:p>
-          <a:p>
-            <a:r>
-              <a:rPr lang="en-US" sz="2400" dirty="0" smtClean="0"/>
-              <a:t>As doctors and hospitals move to a pay-for-performance structure, correct risk assessment and diagnostic codes ensure appropriate payment for treatment of patients with multiple chronic diseases.</a:t>
-            </a:r>
-          </a:p>
-          <a:p>
-            <a:endParaRPr lang="en-US" sz="2400" dirty="0" smtClean="0"/>
-          </a:p>
-          <a:p>
-            <a:endParaRPr lang="en-US" sz="2400" dirty="0"/>
+              <a:rPr lang="en-US" sz="2400" b="1" dirty="0" smtClean="0">
+                <a:effectLst>
+                  <a:outerShdw blurRad="38100" dist="38100" dir="2700000" algn="tl">
+                    <a:srgbClr val="000000">
+                      <a:alpha val="43137"/>
+                    </a:srgbClr>
+                  </a:outerShdw>
+                </a:effectLst>
+              </a:rPr>
+              <a:t>68-year-old </a:t>
+            </a:r>
+            <a:r>
+              <a:rPr lang="en-US" sz="2400" b="1" dirty="0">
+                <a:effectLst>
+                  <a:outerShdw blurRad="38100" dist="38100" dir="2700000" algn="tl">
+                    <a:srgbClr val="000000">
+                      <a:alpha val="43137"/>
+                    </a:srgbClr>
+                  </a:outerShdw>
+                </a:effectLst>
+              </a:rPr>
+              <a:t>man with pneumonia, </a:t>
+            </a:r>
+            <a:r>
+              <a:rPr lang="en-US" sz="2400" b="1" dirty="0" smtClean="0">
+                <a:effectLst>
+                  <a:outerShdw blurRad="38100" dist="38100" dir="2700000" algn="tl">
+                    <a:srgbClr val="000000">
+                      <a:alpha val="43137"/>
+                    </a:srgbClr>
+                  </a:outerShdw>
+                </a:effectLst>
+              </a:rPr>
+              <a:t>emphysema</a:t>
+            </a:r>
+            <a:r>
+              <a:rPr lang="en-US" sz="2400" b="1" dirty="0">
+                <a:effectLst>
+                  <a:outerShdw blurRad="38100" dist="38100" dir="2700000" algn="tl">
+                    <a:srgbClr val="000000">
+                      <a:alpha val="43137"/>
+                    </a:srgbClr>
+                  </a:outerShdw>
+                </a:effectLst>
+              </a:rPr>
+              <a:t>, diabetes with retinopathy, </a:t>
+            </a:r>
+            <a:r>
+              <a:rPr lang="en-US" sz="2400" b="1" dirty="0" smtClean="0">
+                <a:effectLst>
+                  <a:outerShdw blurRad="38100" dist="38100" dir="2700000" algn="tl">
+                    <a:srgbClr val="000000">
+                      <a:alpha val="43137"/>
+                    </a:srgbClr>
+                  </a:outerShdw>
+                </a:effectLst>
+              </a:rPr>
+              <a:t>and </a:t>
+            </a:r>
+            <a:r>
+              <a:rPr lang="en-US" sz="2400" b="1" dirty="0">
+                <a:effectLst>
+                  <a:outerShdw blurRad="38100" dist="38100" dir="2700000" algn="tl">
+                    <a:srgbClr val="000000">
+                      <a:alpha val="43137"/>
+                    </a:srgbClr>
+                  </a:outerShdw>
+                </a:effectLst>
+              </a:rPr>
+              <a:t>respiratory failure.</a:t>
+            </a:r>
+          </a:p>
+          <a:p>
+            <a:endParaRPr lang="en-US" sz="2400" b="1" dirty="0">
+              <a:effectLst>
+                <a:outerShdw blurRad="38100" dist="38100" dir="2700000" algn="tl">
+                  <a:srgbClr val="000000">
+                    <a:alpha val="43137"/>
+                  </a:srgbClr>
+                </a:outerShdw>
+              </a:effectLst>
+            </a:endParaRPr>
+          </a:p>
+        </p:txBody>
+      </p:sp>
+      <p:pic>
+        <p:nvPicPr>
+          <p:cNvPr id="1026" name="Picture 2"/>
+          <p:cNvPicPr>
+            <a:picLocks noChangeAspect="1" noChangeArrowheads="1"/>
+          </p:cNvPicPr>
+          <p:nvPr/>
+        </p:nvPicPr>
+        <p:blipFill rotWithShape="1">
+          <a:blip r:embed="rId3">
+            <a:extLst>
+              <a:ext uri="{28A0092B-C50C-407E-A947-70E740481C1C}">
+                <a14:useLocalDpi xmlns:a14="http://schemas.microsoft.com/office/drawing/2010/main" val="0"/>
+              </a:ext>
+            </a:extLst>
+          </a:blip>
+          <a:srcRect l="1988" t="24234" r="3893" b="1345"/>
+          <a:stretch/>
+        </p:blipFill>
+        <p:spPr bwMode="auto">
+          <a:xfrm>
+            <a:off x="49378" y="2562784"/>
+            <a:ext cx="4389120" cy="3931920"/>
+          </a:xfrm>
+          <a:prstGeom prst="rect">
+            <a:avLst/>
+          </a:prstGeom>
+          <a:noFill/>
+          <a:ln>
+            <a:noFill/>
+          </a:ln>
+          <a:extLst>
+            <a:ext uri="{909E8E84-426E-40DD-AFC4-6F175D3DCCD1}">
+              <a14:hiddenFill xmlns:a14="http://schemas.microsoft.com/office/drawing/2010/main">
+                <a:solidFill>
+                  <a:schemeClr val="accent1"/>
+                </a:solidFill>
+              </a14:hiddenFill>
+            </a:ext>
+            <a:ext uri="{91240B29-F687-4F45-9708-019B960494DF}">
+              <a14:hiddenLine xmlns:a14="http://schemas.microsoft.com/office/drawing/2010/main" w="9525">
+                <a:solidFill>
+                  <a:schemeClr val="tx1"/>
+                </a:solidFill>
+                <a:miter lim="800000"/>
+                <a:headEnd/>
+                <a:tailEnd/>
+              </a14:hiddenLine>
+            </a:ext>
+          </a:extLst>
+        </p:spPr>
+      </p:pic>
+      <p:pic>
+        <p:nvPicPr>
+          <p:cNvPr id="1027" name="Picture 3"/>
+          <p:cNvPicPr>
+            <a:picLocks noChangeAspect="1" noChangeArrowheads="1"/>
+          </p:cNvPicPr>
+          <p:nvPr/>
+        </p:nvPicPr>
+        <p:blipFill rotWithShape="1">
+          <a:blip r:embed="rId4">
+            <a:extLst>
+              <a:ext uri="{28A0092B-C50C-407E-A947-70E740481C1C}">
+                <a14:useLocalDpi xmlns:a14="http://schemas.microsoft.com/office/drawing/2010/main" val="0"/>
+              </a:ext>
+            </a:extLst>
+          </a:blip>
+          <a:srcRect l="1943" t="1341" r="1864" b="2571"/>
+          <a:stretch/>
+        </p:blipFill>
+        <p:spPr bwMode="auto">
+          <a:xfrm>
+            <a:off x="4438498" y="2562784"/>
+            <a:ext cx="4526280" cy="3931920"/>
+          </a:xfrm>
+          <a:prstGeom prst="rect">
+            <a:avLst/>
+          </a:prstGeom>
+          <a:noFill/>
+          <a:ln>
+            <a:noFill/>
+          </a:ln>
+          <a:extLst>
+            <a:ext uri="{909E8E84-426E-40DD-AFC4-6F175D3DCCD1}">
+              <a14:hiddenFill xmlns:a14="http://schemas.microsoft.com/office/drawing/2010/main">
+                <a:solidFill>
+                  <a:schemeClr val="accent1"/>
+                </a:solidFill>
+              </a14:hiddenFill>
+            </a:ext>
+            <a:ext uri="{91240B29-F687-4F45-9708-019B960494DF}">
+              <a14:hiddenLine xmlns:a14="http://schemas.microsoft.com/office/drawing/2010/main" w="9525">
+                <a:solidFill>
+                  <a:schemeClr val="tx1"/>
+                </a:solidFill>
+                <a:miter lim="800000"/>
+                <a:headEnd/>
+                <a:tailEnd/>
+              </a14:hiddenLine>
+            </a:ext>
+          </a:extLst>
+        </p:spPr>
+      </p:pic>
+      <p:sp>
+        <p:nvSpPr>
+          <p:cNvPr id="4" name="TextBox 3"/>
+          <p:cNvSpPr txBox="1"/>
+          <p:nvPr/>
+        </p:nvSpPr>
+        <p:spPr>
+          <a:xfrm>
+            <a:off x="49378" y="6494704"/>
+            <a:ext cx="8561222" cy="369332"/>
+          </a:xfrm>
+          <a:prstGeom prst="rect">
+            <a:avLst/>
+          </a:prstGeom>
+          <a:noFill/>
+        </p:spPr>
+        <p:txBody>
+          <a:bodyPr wrap="square" rtlCol="0">
+            <a:spAutoFit/>
+          </a:bodyPr>
+          <a:lstStyle/>
+          <a:p>
+            <a:r>
+              <a:rPr lang="en-US" dirty="0"/>
+              <a:t>Source: https://www.bcbsal.org/providers/pdfs/riskAdjustment.pdf</a:t>
+            </a:r>
           </a:p>
         </p:txBody>
       </p:sp>
     </p:spTree>
     <p:extLst>
       <p:ext uri="{BB962C8B-B14F-4D97-AF65-F5344CB8AC3E}">
-        <p14:creationId xmlns:p14="http://schemas.microsoft.com/office/powerpoint/2010/main" val="2857344511"/>
+        <p14:creationId xmlns:p14="http://schemas.microsoft.com/office/powerpoint/2010/main" val="508860858"/>
       </p:ext>
     </p:extLst>
   </p:cSld>
@@ -15493,6 +16879,96 @@
               <a:t>The doctor will receive higher payment for treating and improving the health of a higher risk patient.</a:t>
             </a:r>
             <a:endParaRPr lang="en-US" dirty="0"/>
+          </a:p>
+        </p:txBody>
+      </p:sp>
+      <p:pic>
+        <p:nvPicPr>
+          <p:cNvPr id="2050" name="Picture 2" descr="Happy Patient Clipart #1"/>
+          <p:cNvPicPr>
+            <a:picLocks noChangeAspect="1" noChangeArrowheads="1"/>
+          </p:cNvPicPr>
+          <p:nvPr/>
+        </p:nvPicPr>
+        <p:blipFill>
+          <a:blip r:embed="rId2">
+            <a:extLst>
+              <a:ext uri="{28A0092B-C50C-407E-A947-70E740481C1C}">
+                <a14:useLocalDpi xmlns:a14="http://schemas.microsoft.com/office/drawing/2010/main" val="0"/>
+              </a:ext>
+            </a:extLst>
+          </a:blip>
+          <a:srcRect/>
+          <a:stretch>
+            <a:fillRect/>
+          </a:stretch>
+        </p:blipFill>
+        <p:spPr bwMode="auto">
+          <a:xfrm>
+            <a:off x="6019800" y="5181600"/>
+            <a:ext cx="1619250" cy="1104901"/>
+          </a:xfrm>
+          <a:prstGeom prst="rect">
+            <a:avLst/>
+          </a:prstGeom>
+          <a:noFill/>
+          <a:extLst>
+            <a:ext uri="{909E8E84-426E-40DD-AFC4-6F175D3DCCD1}">
+              <a14:hiddenFill xmlns:a14="http://schemas.microsoft.com/office/drawing/2010/main">
+                <a:solidFill>
+                  <a:srgbClr val="FFFFFF"/>
+                </a:solidFill>
+              </a14:hiddenFill>
+            </a:ext>
+          </a:extLst>
+        </p:spPr>
+      </p:pic>
+      <p:sp>
+        <p:nvSpPr>
+          <p:cNvPr id="4" name="TextBox 3"/>
+          <p:cNvSpPr txBox="1"/>
+          <p:nvPr/>
+        </p:nvSpPr>
+        <p:spPr>
+          <a:xfrm>
+            <a:off x="152400" y="6400800"/>
+            <a:ext cx="8763000" cy="523220"/>
+          </a:xfrm>
+          <a:prstGeom prst="rect">
+            <a:avLst/>
+          </a:prstGeom>
+          <a:noFill/>
+        </p:spPr>
+        <p:txBody>
+          <a:bodyPr wrap="square" rtlCol="0">
+            <a:spAutoFit/>
+          </a:bodyPr>
+          <a:lstStyle/>
+          <a:p>
+            <a:r>
+              <a:rPr lang="en-US" sz="1400" dirty="0" smtClean="0">
+                <a:effectLst>
+                  <a:outerShdw blurRad="38100" dist="38100" dir="2700000" algn="tl">
+                    <a:srgbClr val="000000">
+                      <a:alpha val="43137"/>
+                    </a:srgbClr>
+                  </a:outerShdw>
+                </a:effectLst>
+              </a:rPr>
+              <a:t>Image Source</a:t>
+            </a:r>
+            <a:r>
+              <a:rPr lang="en-US" sz="1400" dirty="0">
+                <a:effectLst>
+                  <a:outerShdw blurRad="38100" dist="38100" dir="2700000" algn="tl">
+                    <a:srgbClr val="000000">
+                      <a:alpha val="43137"/>
+                    </a:srgbClr>
+                  </a:outerShdw>
+                </a:effectLst>
+              </a:rPr>
+              <a:t>: http://worldartsme.com/happy-patient-clipart.html#gal_post_104304_happy-patient-clipart-1.jpg</a:t>
+            </a:r>
           </a:p>
         </p:txBody>
       </p:sp>
@@ -15565,7 +17041,7 @@
           <p:nvPr/>
         </p:nvPicPr>
         <p:blipFill>
-          <a:blip r:embed="rId2">
+          <a:blip r:embed="rId3">
             <a:extLst>
               <a:ext uri="{28A0092B-C50C-407E-A947-70E740481C1C}">
                 <a14:useLocalDpi xmlns:a14="http://schemas.microsoft.com/office/drawing/2010/main" val="0"/>
@@ -15668,75 +17144,90 @@
             <p:ph idx="1"/>
           </p:nvPr>
         </p:nvSpPr>
-        <p:spPr/>
+        <p:spPr>
+          <a:xfrm>
+            <a:off x="304800" y="2133600"/>
+            <a:ext cx="8610600" cy="4114800"/>
+          </a:xfrm>
+        </p:spPr>
         <p:txBody>
           <a:bodyPr/>
           <a:lstStyle/>
           <a:p>
             <a:r>
-              <a:rPr lang="en-US" dirty="0" smtClean="0"/>
+              <a:rPr lang="en-US" sz="2800" dirty="0" smtClean="0"/>
               <a:t>Augusto Burgos – Co-Lead Developer</a:t>
             </a:r>
           </a:p>
           <a:p>
             <a:r>
-              <a:rPr lang="en-US" dirty="0" smtClean="0"/>
+              <a:rPr lang="en-US" sz="2800" dirty="0" smtClean="0"/>
               <a:t>Spiro </a:t>
             </a:r>
             <a:r>
-              <a:rPr lang="en-US" dirty="0" err="1" smtClean="0"/>
+              <a:rPr lang="en-US" sz="2800" dirty="0" err="1" smtClean="0"/>
               <a:t>Ganas</a:t>
             </a:r>
             <a:r>
-              <a:rPr lang="en-US" dirty="0" smtClean="0"/>
-              <a:t> – Project Sponsor</a:t>
-            </a:r>
-          </a:p>
-          <a:p>
-            <a:r>
-              <a:rPr lang="en-US" dirty="0" smtClean="0"/>
+              <a:rPr lang="en-US" sz="2800" dirty="0" smtClean="0"/>
+              <a:t> – Project </a:t>
+            </a:r>
+            <a:r>
+              <a:rPr lang="en-US" sz="2800" dirty="0" smtClean="0"/>
+              <a:t>Sponsor / Developer</a:t>
+            </a:r>
+            <a:endParaRPr lang="en-US" sz="2800" dirty="0" smtClean="0"/>
+          </a:p>
+          <a:p>
+            <a:r>
+              <a:rPr lang="en-US" sz="2800" dirty="0" smtClean="0"/>
               <a:t>Anja Guillory – Co-Lead Developer</a:t>
             </a:r>
           </a:p>
           <a:p>
             <a:r>
-              <a:rPr lang="en-US" dirty="0" smtClean="0"/>
+              <a:rPr lang="en-US" sz="2800" dirty="0" smtClean="0"/>
               <a:t>Jamie </a:t>
             </a:r>
             <a:r>
-              <a:rPr lang="en-US" dirty="0" err="1" smtClean="0"/>
+              <a:rPr lang="en-US" sz="2800" dirty="0" err="1" smtClean="0"/>
               <a:t>Richgels</a:t>
             </a:r>
             <a:r>
-              <a:rPr lang="en-US" dirty="0" smtClean="0"/>
+              <a:rPr lang="en-US" sz="2800" dirty="0" smtClean="0"/>
               <a:t> – UI testing and Business Analyst</a:t>
             </a:r>
           </a:p>
           <a:p>
             <a:r>
-              <a:rPr lang="en-US" dirty="0" smtClean="0"/>
+              <a:rPr lang="en-US" sz="2800" dirty="0" smtClean="0"/>
               <a:t>Daniel </a:t>
             </a:r>
             <a:r>
-              <a:rPr lang="en-US" dirty="0" err="1" smtClean="0"/>
+              <a:rPr lang="en-US" sz="2800" dirty="0" err="1" smtClean="0"/>
               <a:t>Stoneburner</a:t>
             </a:r>
             <a:r>
-              <a:rPr lang="en-US" dirty="0" smtClean="0"/>
+              <a:rPr lang="en-US" sz="2800" dirty="0" smtClean="0"/>
               <a:t> – Code testing</a:t>
             </a:r>
           </a:p>
           <a:p>
             <a:r>
-              <a:rPr lang="en-US" dirty="0" smtClean="0"/>
-              <a:t>Tala Suidan – Project Manager</a:t>
-            </a:r>
-          </a:p>
-          <a:p>
-            <a:endParaRPr lang="en-US" dirty="0" smtClean="0"/>
-          </a:p>
-          <a:p>
-            <a:endParaRPr lang="en-US" dirty="0"/>
+              <a:rPr lang="en-US" sz="2800" dirty="0" smtClean="0"/>
+              <a:t>Tala Suidan – Project </a:t>
+            </a:r>
+            <a:r>
+              <a:rPr lang="en-US" sz="2800" dirty="0" smtClean="0"/>
+              <a:t>Manager / Business Analyst</a:t>
+            </a:r>
+            <a:endParaRPr lang="en-US" sz="2800" dirty="0" smtClean="0"/>
+          </a:p>
+          <a:p>
+            <a:endParaRPr lang="en-US" sz="2800" dirty="0" smtClean="0"/>
+          </a:p>
+          <a:p>
+            <a:endParaRPr lang="en-US" sz="2800" dirty="0"/>
           </a:p>
         </p:txBody>
       </p:sp>

</xml_diff>